<commit_message>
adjust adc and encoder sample time
</commit_message>
<xml_diff>
--- a/RA8T2 外设使用指导.pptx
+++ b/RA8T2 外设使用指导.pptx
@@ -14,7 +14,9 @@
     <p:sldId id="265" r:id="rId8"/>
     <p:sldId id="259" r:id="rId9"/>
     <p:sldId id="263" r:id="rId10"/>
-    <p:sldId id="264" r:id="rId11"/>
+    <p:sldId id="266" r:id="rId11"/>
+    <p:sldId id="267" r:id="rId12"/>
+    <p:sldId id="264" r:id="rId13"/>
   </p:sldIdLst>
   <p:sldSz cx="12192000" cy="6858000"/>
   <p:notesSz cx="6858000" cy="9144000"/>
@@ -268,7 +270,7 @@
           <a:p>
             <a:fld id="{DB0EC105-BE58-48DE-9ABF-B2C3C8FB05BE}" type="datetimeFigureOut">
               <a:rPr lang="en-US" smtClean="0"/>
-              <a:t>12/1/2025</a:t>
+              <a:t>12/8/2025</a:t>
             </a:fld>
             <a:endParaRPr lang="en-US"/>
           </a:p>
@@ -466,7 +468,7 @@
           <a:p>
             <a:fld id="{DB0EC105-BE58-48DE-9ABF-B2C3C8FB05BE}" type="datetimeFigureOut">
               <a:rPr lang="en-US" smtClean="0"/>
-              <a:t>12/1/2025</a:t>
+              <a:t>12/8/2025</a:t>
             </a:fld>
             <a:endParaRPr lang="en-US"/>
           </a:p>
@@ -674,7 +676,7 @@
           <a:p>
             <a:fld id="{DB0EC105-BE58-48DE-9ABF-B2C3C8FB05BE}" type="datetimeFigureOut">
               <a:rPr lang="en-US" smtClean="0"/>
-              <a:t>12/1/2025</a:t>
+              <a:t>12/8/2025</a:t>
             </a:fld>
             <a:endParaRPr lang="en-US"/>
           </a:p>
@@ -872,7 +874,7 @@
           <a:p>
             <a:fld id="{DB0EC105-BE58-48DE-9ABF-B2C3C8FB05BE}" type="datetimeFigureOut">
               <a:rPr lang="en-US" smtClean="0"/>
-              <a:t>12/1/2025</a:t>
+              <a:t>12/8/2025</a:t>
             </a:fld>
             <a:endParaRPr lang="en-US"/>
           </a:p>
@@ -1147,7 +1149,7 @@
           <a:p>
             <a:fld id="{DB0EC105-BE58-48DE-9ABF-B2C3C8FB05BE}" type="datetimeFigureOut">
               <a:rPr lang="en-US" smtClean="0"/>
-              <a:t>12/1/2025</a:t>
+              <a:t>12/8/2025</a:t>
             </a:fld>
             <a:endParaRPr lang="en-US"/>
           </a:p>
@@ -1412,7 +1414,7 @@
           <a:p>
             <a:fld id="{DB0EC105-BE58-48DE-9ABF-B2C3C8FB05BE}" type="datetimeFigureOut">
               <a:rPr lang="en-US" smtClean="0"/>
-              <a:t>12/1/2025</a:t>
+              <a:t>12/8/2025</a:t>
             </a:fld>
             <a:endParaRPr lang="en-US"/>
           </a:p>
@@ -1824,7 +1826,7 @@
           <a:p>
             <a:fld id="{DB0EC105-BE58-48DE-9ABF-B2C3C8FB05BE}" type="datetimeFigureOut">
               <a:rPr lang="en-US" smtClean="0"/>
-              <a:t>12/1/2025</a:t>
+              <a:t>12/8/2025</a:t>
             </a:fld>
             <a:endParaRPr lang="en-US"/>
           </a:p>
@@ -1965,7 +1967,7 @@
           <a:p>
             <a:fld id="{DB0EC105-BE58-48DE-9ABF-B2C3C8FB05BE}" type="datetimeFigureOut">
               <a:rPr lang="en-US" smtClean="0"/>
-              <a:t>12/1/2025</a:t>
+              <a:t>12/8/2025</a:t>
             </a:fld>
             <a:endParaRPr lang="en-US"/>
           </a:p>
@@ -2078,7 +2080,7 @@
           <a:p>
             <a:fld id="{DB0EC105-BE58-48DE-9ABF-B2C3C8FB05BE}" type="datetimeFigureOut">
               <a:rPr lang="en-US" smtClean="0"/>
-              <a:t>12/1/2025</a:t>
+              <a:t>12/8/2025</a:t>
             </a:fld>
             <a:endParaRPr lang="en-US"/>
           </a:p>
@@ -2389,7 +2391,7 @@
           <a:p>
             <a:fld id="{DB0EC105-BE58-48DE-9ABF-B2C3C8FB05BE}" type="datetimeFigureOut">
               <a:rPr lang="en-US" smtClean="0"/>
-              <a:t>12/1/2025</a:t>
+              <a:t>12/8/2025</a:t>
             </a:fld>
             <a:endParaRPr lang="en-US"/>
           </a:p>
@@ -2677,7 +2679,7 @@
           <a:p>
             <a:fld id="{DB0EC105-BE58-48DE-9ABF-B2C3C8FB05BE}" type="datetimeFigureOut">
               <a:rPr lang="en-US" smtClean="0"/>
-              <a:t>12/1/2025</a:t>
+              <a:t>12/8/2025</a:t>
             </a:fld>
             <a:endParaRPr lang="en-US"/>
           </a:p>
@@ -2918,7 +2920,7 @@
           <a:p>
             <a:fld id="{DB0EC105-BE58-48DE-9ABF-B2C3C8FB05BE}" type="datetimeFigureOut">
               <a:rPr lang="en-US" smtClean="0"/>
-              <a:t>12/1/2025</a:t>
+              <a:t>12/8/2025</a:t>
             </a:fld>
             <a:endParaRPr lang="en-US"/>
           </a:p>
@@ -3419,6 +3421,530 @@
 </file>
 
 <file path=ppt/slides/slide10.xml><?xml version="1.0" encoding="utf-8"?>
+<p:sld xmlns:a="http://schemas.openxmlformats.org/drawingml/2006/main" xmlns:r="http://schemas.openxmlformats.org/officeDocument/2006/relationships" xmlns:p="http://schemas.openxmlformats.org/presentationml/2006/main">
+  <p:cSld>
+    <p:spTree>
+      <p:nvGrpSpPr>
+        <p:cNvPr id="1" name=""/>
+        <p:cNvGrpSpPr/>
+        <p:nvPr/>
+      </p:nvGrpSpPr>
+      <p:grpSpPr>
+        <a:xfrm>
+          <a:off x="0" y="0"/>
+          <a:ext cx="0" cy="0"/>
+          <a:chOff x="0" y="0"/>
+          <a:chExt cx="0" cy="0"/>
+        </a:xfrm>
+      </p:grpSpPr>
+      <p:sp>
+        <p:nvSpPr>
+          <p:cNvPr id="2" name="TextBox 1">
+            <a:extLst>
+              <a:ext uri="{FF2B5EF4-FFF2-40B4-BE49-F238E27FC236}">
+                <a16:creationId xmlns:a16="http://schemas.microsoft.com/office/drawing/2014/main" id="{129B4742-3389-8287-B155-CB3BE0CB4F4C}"/>
+              </a:ext>
+            </a:extLst>
+          </p:cNvPr>
+          <p:cNvSpPr txBox="1"/>
+          <p:nvPr/>
+        </p:nvSpPr>
+        <p:spPr>
+          <a:xfrm>
+            <a:off x="667512" y="539496"/>
+            <a:ext cx="5302221" cy="1200329"/>
+          </a:xfrm>
+          <a:prstGeom prst="rect">
+            <a:avLst/>
+          </a:prstGeom>
+          <a:noFill/>
+        </p:spPr>
+        <p:txBody>
+          <a:bodyPr wrap="none" rtlCol="0">
+            <a:spAutoFit/>
+          </a:bodyPr>
+          <a:lstStyle/>
+          <a:p>
+            <a:r>
+              <a:rPr lang="zh-CN" altLang="en-US" dirty="0"/>
+              <a:t>设置三个变量，观测</a:t>
+            </a:r>
+            <a:r>
+              <a:rPr lang="en-US" altLang="zh-CN" dirty="0"/>
+              <a:t>PWM, ADC, </a:t>
+            </a:r>
+            <a:r>
+              <a:rPr lang="zh-CN" altLang="en-US" dirty="0"/>
+              <a:t>编码器是否同步：</a:t>
+            </a:r>
+            <a:endParaRPr lang="en-US" altLang="zh-CN" dirty="0"/>
+          </a:p>
+          <a:p>
+            <a:r>
+              <a:rPr lang="fr-FR" dirty="0"/>
+              <a:t>volatile uint32_t </a:t>
+            </a:r>
+            <a:r>
+              <a:rPr lang="fr-FR" dirty="0" err="1"/>
+              <a:t>adc_cnt</a:t>
+            </a:r>
+            <a:r>
+              <a:rPr lang="fr-FR" dirty="0"/>
+              <a:t> = 0;</a:t>
+            </a:r>
+          </a:p>
+          <a:p>
+            <a:r>
+              <a:rPr lang="fr-FR" dirty="0"/>
+              <a:t>volatile uint32_t </a:t>
+            </a:r>
+            <a:r>
+              <a:rPr lang="fr-FR" dirty="0" err="1"/>
+              <a:t>comppwm_cnt</a:t>
+            </a:r>
+            <a:r>
+              <a:rPr lang="fr-FR" dirty="0"/>
+              <a:t> = 0 ;</a:t>
+            </a:r>
+          </a:p>
+          <a:p>
+            <a:r>
+              <a:rPr lang="fr-FR" dirty="0"/>
+              <a:t>volatile uint32_t </a:t>
+            </a:r>
+            <a:r>
+              <a:rPr lang="fr-FR" dirty="0" err="1"/>
+              <a:t>encoder_cnt</a:t>
+            </a:r>
+            <a:r>
+              <a:rPr lang="fr-FR" dirty="0"/>
+              <a:t> = 0;</a:t>
+            </a:r>
+            <a:endParaRPr lang="en-US" dirty="0"/>
+          </a:p>
+        </p:txBody>
+      </p:sp>
+      <p:pic>
+        <p:nvPicPr>
+          <p:cNvPr id="4" name="Picture 3">
+            <a:extLst>
+              <a:ext uri="{FF2B5EF4-FFF2-40B4-BE49-F238E27FC236}">
+                <a16:creationId xmlns:a16="http://schemas.microsoft.com/office/drawing/2014/main" id="{678501E3-99B4-DBAE-4116-22997DD95173}"/>
+              </a:ext>
+            </a:extLst>
+          </p:cNvPr>
+          <p:cNvPicPr>
+            <a:picLocks noChangeAspect="1"/>
+          </p:cNvPicPr>
+          <p:nvPr/>
+        </p:nvPicPr>
+        <p:blipFill>
+          <a:blip r:embed="rId2"/>
+          <a:stretch>
+            <a:fillRect/>
+          </a:stretch>
+        </p:blipFill>
+        <p:spPr>
+          <a:xfrm>
+            <a:off x="667512" y="1739825"/>
+            <a:ext cx="11313490" cy="3093112"/>
+          </a:xfrm>
+          <a:prstGeom prst="rect">
+            <a:avLst/>
+          </a:prstGeom>
+        </p:spPr>
+      </p:pic>
+    </p:spTree>
+    <p:extLst>
+      <p:ext uri="{BB962C8B-B14F-4D97-AF65-F5344CB8AC3E}">
+        <p14:creationId xmlns:p14="http://schemas.microsoft.com/office/powerpoint/2010/main" val="3815298054"/>
+      </p:ext>
+    </p:extLst>
+  </p:cSld>
+  <p:clrMapOvr>
+    <a:masterClrMapping/>
+  </p:clrMapOvr>
+</p:sld>
+</file>
+
+<file path=ppt/slides/slide11.xml><?xml version="1.0" encoding="utf-8"?>
+<p:sld xmlns:a="http://schemas.openxmlformats.org/drawingml/2006/main" xmlns:r="http://schemas.openxmlformats.org/officeDocument/2006/relationships" xmlns:p="http://schemas.openxmlformats.org/presentationml/2006/main">
+  <p:cSld>
+    <p:spTree>
+      <p:nvGrpSpPr>
+        <p:cNvPr id="1" name="">
+          <a:extLst>
+            <a:ext uri="{FF2B5EF4-FFF2-40B4-BE49-F238E27FC236}">
+              <a16:creationId xmlns:a16="http://schemas.microsoft.com/office/drawing/2014/main" id="{2C855A1A-53A3-03BC-FB0C-F2062EB807EA}"/>
+            </a:ext>
+          </a:extLst>
+        </p:cNvPr>
+        <p:cNvGrpSpPr/>
+        <p:nvPr/>
+      </p:nvGrpSpPr>
+      <p:grpSpPr>
+        <a:xfrm>
+          <a:off x="0" y="0"/>
+          <a:ext cx="0" cy="0"/>
+          <a:chOff x="0" y="0"/>
+          <a:chExt cx="0" cy="0"/>
+        </a:xfrm>
+      </p:grpSpPr>
+      <p:sp>
+        <p:nvSpPr>
+          <p:cNvPr id="2" name="TextBox 1">
+            <a:extLst>
+              <a:ext uri="{FF2B5EF4-FFF2-40B4-BE49-F238E27FC236}">
+                <a16:creationId xmlns:a16="http://schemas.microsoft.com/office/drawing/2014/main" id="{E0A44628-36A8-1189-7D02-635C129576F0}"/>
+              </a:ext>
+            </a:extLst>
+          </p:cNvPr>
+          <p:cNvSpPr txBox="1"/>
+          <p:nvPr/>
+        </p:nvSpPr>
+        <p:spPr>
+          <a:xfrm>
+            <a:off x="667512" y="713232"/>
+            <a:ext cx="6511719" cy="369332"/>
+          </a:xfrm>
+          <a:prstGeom prst="rect">
+            <a:avLst/>
+          </a:prstGeom>
+          <a:noFill/>
+        </p:spPr>
+        <p:txBody>
+          <a:bodyPr wrap="none" rtlCol="0">
+            <a:spAutoFit/>
+          </a:bodyPr>
+          <a:lstStyle/>
+          <a:p>
+            <a:r>
+              <a:rPr lang="en-US" altLang="zh-CN" dirty="0"/>
+              <a:t>AD</a:t>
+            </a:r>
+            <a:r>
+              <a:rPr lang="zh-CN" altLang="en-US" dirty="0"/>
+              <a:t>触发位置： 减计数的</a:t>
+            </a:r>
+            <a:r>
+              <a:rPr lang="en-US" altLang="zh-CN" dirty="0"/>
+              <a:t>5</a:t>
+            </a:r>
+            <a:r>
+              <a:rPr lang="zh-CN" altLang="en-US" dirty="0"/>
+              <a:t>，即到达波谷前 </a:t>
+            </a:r>
+            <a:r>
+              <a:rPr lang="en-US" altLang="zh-CN" dirty="0"/>
+              <a:t>5 * 0.333us = 1.6us</a:t>
+            </a:r>
+            <a:r>
+              <a:rPr lang="zh-CN" altLang="en-US" dirty="0"/>
+              <a:t>处</a:t>
+            </a:r>
+            <a:endParaRPr lang="en-US" dirty="0"/>
+          </a:p>
+        </p:txBody>
+      </p:sp>
+      <p:pic>
+        <p:nvPicPr>
+          <p:cNvPr id="6" name="Picture 5">
+            <a:extLst>
+              <a:ext uri="{FF2B5EF4-FFF2-40B4-BE49-F238E27FC236}">
+                <a16:creationId xmlns:a16="http://schemas.microsoft.com/office/drawing/2014/main" id="{45D4C2D5-E8E2-D053-C012-0A3EF40EB020}"/>
+              </a:ext>
+            </a:extLst>
+          </p:cNvPr>
+          <p:cNvPicPr>
+            <a:picLocks noChangeAspect="1"/>
+          </p:cNvPicPr>
+          <p:nvPr/>
+        </p:nvPicPr>
+        <p:blipFill>
+          <a:blip r:embed="rId2"/>
+          <a:stretch>
+            <a:fillRect/>
+          </a:stretch>
+        </p:blipFill>
+        <p:spPr>
+          <a:xfrm>
+            <a:off x="737599" y="1082565"/>
+            <a:ext cx="6581525" cy="1465040"/>
+          </a:xfrm>
+          <a:prstGeom prst="rect">
+            <a:avLst/>
+          </a:prstGeom>
+        </p:spPr>
+      </p:pic>
+      <p:sp>
+        <p:nvSpPr>
+          <p:cNvPr id="3" name="TextBox 2">
+            <a:extLst>
+              <a:ext uri="{FF2B5EF4-FFF2-40B4-BE49-F238E27FC236}">
+                <a16:creationId xmlns:a16="http://schemas.microsoft.com/office/drawing/2014/main" id="{9E0D97B3-6A7D-AB2B-C3E4-7BDB784791F9}"/>
+              </a:ext>
+            </a:extLst>
+          </p:cNvPr>
+          <p:cNvSpPr txBox="1"/>
+          <p:nvPr/>
+        </p:nvSpPr>
+        <p:spPr>
+          <a:xfrm>
+            <a:off x="518317" y="2729805"/>
+            <a:ext cx="6810108" cy="646331"/>
+          </a:xfrm>
+          <a:prstGeom prst="rect">
+            <a:avLst/>
+          </a:prstGeom>
+          <a:noFill/>
+        </p:spPr>
+        <p:txBody>
+          <a:bodyPr wrap="square" rtlCol="0">
+            <a:spAutoFit/>
+          </a:bodyPr>
+          <a:lstStyle/>
+          <a:p>
+            <a:r>
+              <a:rPr lang="zh-CN" altLang="en-US" dirty="0"/>
+              <a:t>编码器读取触发位置： 比较匹配值</a:t>
+            </a:r>
+            <a:r>
+              <a:rPr lang="en-US" altLang="zh-CN" dirty="0"/>
+              <a:t>14987</a:t>
+            </a:r>
+            <a:r>
+              <a:rPr lang="zh-CN" altLang="en-US" dirty="0"/>
+              <a:t>，即到达波谷前 </a:t>
+            </a:r>
+            <a:r>
+              <a:rPr lang="en-US" altLang="zh-CN" dirty="0"/>
+              <a:t>13 * 0.333us = 4us</a:t>
+            </a:r>
+            <a:r>
+              <a:rPr lang="zh-CN" altLang="en-US" dirty="0"/>
+              <a:t>处</a:t>
+            </a:r>
+            <a:r>
+              <a:rPr lang="en-US" altLang="zh-CN" dirty="0"/>
+              <a:t>.</a:t>
+            </a:r>
+            <a:r>
+              <a:rPr lang="zh-CN" altLang="en-US" dirty="0"/>
+              <a:t>此处是提前</a:t>
+            </a:r>
+            <a:r>
+              <a:rPr lang="en-US" altLang="zh-CN" dirty="0"/>
+              <a:t>4us</a:t>
+            </a:r>
+            <a:r>
+              <a:rPr lang="zh-CN" altLang="en-US" dirty="0"/>
+              <a:t>发送</a:t>
+            </a:r>
+            <a:r>
+              <a:rPr lang="en-US" altLang="zh-CN" dirty="0"/>
+              <a:t>0x73</a:t>
+            </a:r>
+            <a:r>
+              <a:rPr lang="zh-CN" altLang="en-US" dirty="0"/>
+              <a:t>读取波谷时刻的位置信息</a:t>
+            </a:r>
+            <a:endParaRPr lang="en-US" dirty="0"/>
+          </a:p>
+        </p:txBody>
+      </p:sp>
+      <p:pic>
+        <p:nvPicPr>
+          <p:cNvPr id="7" name="Picture 6">
+            <a:extLst>
+              <a:ext uri="{FF2B5EF4-FFF2-40B4-BE49-F238E27FC236}">
+                <a16:creationId xmlns:a16="http://schemas.microsoft.com/office/drawing/2014/main" id="{F844DE66-792C-D526-6D54-4A9B4DC3072C}"/>
+              </a:ext>
+            </a:extLst>
+          </p:cNvPr>
+          <p:cNvPicPr>
+            <a:picLocks noChangeAspect="1"/>
+          </p:cNvPicPr>
+          <p:nvPr/>
+        </p:nvPicPr>
+        <p:blipFill>
+          <a:blip r:embed="rId3"/>
+          <a:stretch>
+            <a:fillRect/>
+          </a:stretch>
+        </p:blipFill>
+        <p:spPr>
+          <a:xfrm>
+            <a:off x="737599" y="3376136"/>
+            <a:ext cx="6098290" cy="1558060"/>
+          </a:xfrm>
+          <a:prstGeom prst="rect">
+            <a:avLst/>
+          </a:prstGeom>
+        </p:spPr>
+      </p:pic>
+      <p:pic>
+        <p:nvPicPr>
+          <p:cNvPr id="15" name="Picture 14">
+            <a:extLst>
+              <a:ext uri="{FF2B5EF4-FFF2-40B4-BE49-F238E27FC236}">
+                <a16:creationId xmlns:a16="http://schemas.microsoft.com/office/drawing/2014/main" id="{2625F1C2-C813-8FBC-815C-AD8A68179581}"/>
+              </a:ext>
+            </a:extLst>
+          </p:cNvPr>
+          <p:cNvPicPr>
+            <a:picLocks noChangeAspect="1"/>
+          </p:cNvPicPr>
+          <p:nvPr/>
+        </p:nvPicPr>
+        <p:blipFill>
+          <a:blip r:embed="rId4"/>
+          <a:stretch>
+            <a:fillRect/>
+          </a:stretch>
+        </p:blipFill>
+        <p:spPr>
+          <a:xfrm>
+            <a:off x="7179231" y="3480293"/>
+            <a:ext cx="4475251" cy="2502210"/>
+          </a:xfrm>
+          <a:prstGeom prst="rect">
+            <a:avLst/>
+          </a:prstGeom>
+        </p:spPr>
+      </p:pic>
+      <p:cxnSp>
+        <p:nvCxnSpPr>
+          <p:cNvPr id="23" name="Straight Arrow Connector 22">
+            <a:extLst>
+              <a:ext uri="{FF2B5EF4-FFF2-40B4-BE49-F238E27FC236}">
+                <a16:creationId xmlns:a16="http://schemas.microsoft.com/office/drawing/2014/main" id="{45584445-273F-12F0-0A52-AE57D1491CED}"/>
+              </a:ext>
+            </a:extLst>
+          </p:cNvPr>
+          <p:cNvCxnSpPr/>
+          <p:nvPr/>
+        </p:nvCxnSpPr>
+        <p:spPr>
+          <a:xfrm flipH="1">
+            <a:off x="6345936" y="3776472"/>
+            <a:ext cx="2459736" cy="292608"/>
+          </a:xfrm>
+          <a:prstGeom prst="straightConnector1">
+            <a:avLst/>
+          </a:prstGeom>
+          <a:ln>
+            <a:tailEnd type="triangle"/>
+          </a:ln>
+        </p:spPr>
+        <p:style>
+          <a:lnRef idx="2">
+            <a:schemeClr val="accent5"/>
+          </a:lnRef>
+          <a:fillRef idx="0">
+            <a:schemeClr val="accent5"/>
+          </a:fillRef>
+          <a:effectRef idx="1">
+            <a:schemeClr val="accent5"/>
+          </a:effectRef>
+          <a:fontRef idx="minor">
+            <a:schemeClr val="tx1"/>
+          </a:fontRef>
+        </p:style>
+      </p:cxnSp>
+      <p:cxnSp>
+        <p:nvCxnSpPr>
+          <p:cNvPr id="25" name="Straight Arrow Connector 24">
+            <a:extLst>
+              <a:ext uri="{FF2B5EF4-FFF2-40B4-BE49-F238E27FC236}">
+                <a16:creationId xmlns:a16="http://schemas.microsoft.com/office/drawing/2014/main" id="{25C09307-AB55-6EC4-42CC-7557416D503E}"/>
+              </a:ext>
+            </a:extLst>
+          </p:cNvPr>
+          <p:cNvCxnSpPr/>
+          <p:nvPr/>
+        </p:nvCxnSpPr>
+        <p:spPr>
+          <a:xfrm flipH="1" flipV="1">
+            <a:off x="4882896" y="2276856"/>
+            <a:ext cx="4005072" cy="2798064"/>
+          </a:xfrm>
+          <a:prstGeom prst="straightConnector1">
+            <a:avLst/>
+          </a:prstGeom>
+          <a:ln>
+            <a:tailEnd type="triangle"/>
+          </a:ln>
+        </p:spPr>
+        <p:style>
+          <a:lnRef idx="2">
+            <a:schemeClr val="accent2"/>
+          </a:lnRef>
+          <a:fillRef idx="0">
+            <a:schemeClr val="accent2"/>
+          </a:fillRef>
+          <a:effectRef idx="1">
+            <a:schemeClr val="accent2"/>
+          </a:effectRef>
+          <a:fontRef idx="minor">
+            <a:schemeClr val="tx1"/>
+          </a:fontRef>
+        </p:style>
+      </p:cxnSp>
+      <p:cxnSp>
+        <p:nvCxnSpPr>
+          <p:cNvPr id="27" name="Straight Arrow Connector 26">
+            <a:extLst>
+              <a:ext uri="{FF2B5EF4-FFF2-40B4-BE49-F238E27FC236}">
+                <a16:creationId xmlns:a16="http://schemas.microsoft.com/office/drawing/2014/main" id="{97D775B9-1300-9E68-B73B-1FF46C018D6B}"/>
+              </a:ext>
+            </a:extLst>
+          </p:cNvPr>
+          <p:cNvCxnSpPr>
+            <a:cxnSpLocks/>
+          </p:cNvCxnSpPr>
+          <p:nvPr/>
+        </p:nvCxnSpPr>
+        <p:spPr>
+          <a:xfrm flipH="1" flipV="1">
+            <a:off x="4800600" y="1892808"/>
+            <a:ext cx="4087368" cy="3182112"/>
+          </a:xfrm>
+          <a:prstGeom prst="straightConnector1">
+            <a:avLst/>
+          </a:prstGeom>
+          <a:ln>
+            <a:tailEnd type="triangle"/>
+          </a:ln>
+        </p:spPr>
+        <p:style>
+          <a:lnRef idx="2">
+            <a:schemeClr val="accent2"/>
+          </a:lnRef>
+          <a:fillRef idx="0">
+            <a:schemeClr val="accent2"/>
+          </a:fillRef>
+          <a:effectRef idx="1">
+            <a:schemeClr val="accent2"/>
+          </a:effectRef>
+          <a:fontRef idx="minor">
+            <a:schemeClr val="tx1"/>
+          </a:fontRef>
+        </p:style>
+      </p:cxnSp>
+    </p:spTree>
+    <p:extLst>
+      <p:ext uri="{BB962C8B-B14F-4D97-AF65-F5344CB8AC3E}">
+        <p14:creationId xmlns:p14="http://schemas.microsoft.com/office/powerpoint/2010/main" val="502179057"/>
+      </p:ext>
+    </p:extLst>
+  </p:cSld>
+  <p:clrMapOvr>
+    <a:masterClrMapping/>
+  </p:clrMapOvr>
+</p:sld>
+</file>
+
+<file path=ppt/slides/slide12.xml><?xml version="1.0" encoding="utf-8"?>
 <p:sld xmlns:a="http://schemas.openxmlformats.org/drawingml/2006/main" xmlns:r="http://schemas.openxmlformats.org/officeDocument/2006/relationships" xmlns:p="http://schemas.openxmlformats.org/presentationml/2006/main">
   <p:cSld>
     <p:spTree>

</xml_diff>

<commit_message>
add cpu1 debug workspace and project, update user's manual slides, update readME
</commit_message>
<xml_diff>
--- a/RA8T2 外设使用指导.pptx
+++ b/RA8T2 外设使用指导.pptx
@@ -17,6 +17,9 @@
     <p:sldId id="266" r:id="rId11"/>
     <p:sldId id="267" r:id="rId12"/>
     <p:sldId id="264" r:id="rId13"/>
+    <p:sldId id="268" r:id="rId14"/>
+    <p:sldId id="269" r:id="rId15"/>
+    <p:sldId id="270" r:id="rId16"/>
   </p:sldIdLst>
   <p:sldSz cx="12192000" cy="6858000"/>
   <p:notesSz cx="6858000" cy="9144000"/>
@@ -4257,6 +4260,1314 @@
     <p:extLst>
       <p:ext uri="{BB962C8B-B14F-4D97-AF65-F5344CB8AC3E}">
         <p14:creationId xmlns:p14="http://schemas.microsoft.com/office/powerpoint/2010/main" val="940017767"/>
+      </p:ext>
+    </p:extLst>
+  </p:cSld>
+  <p:clrMapOvr>
+    <a:masterClrMapping/>
+  </p:clrMapOvr>
+</p:sld>
+</file>
+
+<file path=ppt/slides/slide13.xml><?xml version="1.0" encoding="utf-8"?>
+<p:sld xmlns:a="http://schemas.openxmlformats.org/drawingml/2006/main" xmlns:r="http://schemas.openxmlformats.org/officeDocument/2006/relationships" xmlns:p="http://schemas.openxmlformats.org/presentationml/2006/main">
+  <p:cSld>
+    <p:spTree>
+      <p:nvGrpSpPr>
+        <p:cNvPr id="1" name=""/>
+        <p:cNvGrpSpPr/>
+        <p:nvPr/>
+      </p:nvGrpSpPr>
+      <p:grpSpPr>
+        <a:xfrm>
+          <a:off x="0" y="0"/>
+          <a:ext cx="0" cy="0"/>
+          <a:chOff x="0" y="0"/>
+          <a:chExt cx="0" cy="0"/>
+        </a:xfrm>
+      </p:grpSpPr>
+      <p:sp>
+        <p:nvSpPr>
+          <p:cNvPr id="3" name="TextBox 2">
+            <a:extLst>
+              <a:ext uri="{FF2B5EF4-FFF2-40B4-BE49-F238E27FC236}">
+                <a16:creationId xmlns:a16="http://schemas.microsoft.com/office/drawing/2014/main" id="{AF5AABA6-8D69-A46B-0AA1-530937214B33}"/>
+              </a:ext>
+            </a:extLst>
+          </p:cNvPr>
+          <p:cNvSpPr txBox="1"/>
+          <p:nvPr/>
+        </p:nvSpPr>
+        <p:spPr>
+          <a:xfrm>
+            <a:off x="274971" y="411480"/>
+            <a:ext cx="3021643" cy="2308324"/>
+          </a:xfrm>
+          <a:prstGeom prst="rect">
+            <a:avLst/>
+          </a:prstGeom>
+          <a:noFill/>
+        </p:spPr>
+        <p:txBody>
+          <a:bodyPr wrap="square" rtlCol="0">
+            <a:spAutoFit/>
+          </a:bodyPr>
+          <a:lstStyle/>
+          <a:p>
+            <a:r>
+              <a:rPr lang="zh-CN" altLang="en-US" dirty="0"/>
+              <a:t>双核调试：</a:t>
+            </a:r>
+            <a:endParaRPr lang="en-US" altLang="zh-CN" dirty="0"/>
+          </a:p>
+          <a:p>
+            <a:pPr marL="342900" indent="-342900">
+              <a:buAutoNum type="arabicPeriod"/>
+            </a:pPr>
+            <a:r>
+              <a:rPr lang="zh-CN" altLang="en-US" dirty="0"/>
+              <a:t>新建</a:t>
+            </a:r>
+            <a:r>
+              <a:rPr lang="en-US" dirty="0"/>
+              <a:t>workspace</a:t>
+            </a:r>
+            <a:r>
+              <a:rPr lang="zh-CN" altLang="en-US" dirty="0"/>
+              <a:t>，创建新的工程</a:t>
+            </a:r>
+            <a:endParaRPr lang="en-US" altLang="zh-CN" dirty="0"/>
+          </a:p>
+          <a:p>
+            <a:pPr marL="342900" indent="-342900">
+              <a:buFontTx/>
+              <a:buAutoNum type="arabicPeriod"/>
+            </a:pPr>
+            <a:r>
+              <a:rPr lang="zh-CN" altLang="en-US" dirty="0"/>
+              <a:t>创建新的工程</a:t>
+            </a:r>
+            <a:endParaRPr lang="en-US" altLang="zh-CN" dirty="0"/>
+          </a:p>
+          <a:p>
+            <a:pPr marL="342900" indent="-342900">
+              <a:buFontTx/>
+              <a:buAutoNum type="arabicPeriod"/>
+            </a:pPr>
+            <a:r>
+              <a:rPr lang="zh-CN" altLang="en-US" dirty="0"/>
+              <a:t>工程命名为</a:t>
+            </a:r>
+            <a:r>
+              <a:rPr lang="en-US" dirty="0"/>
+              <a:t>CPU1_debug</a:t>
+            </a:r>
+            <a:br>
+              <a:rPr lang="en-US" dirty="0"/>
+            </a:br>
+            <a:r>
+              <a:rPr lang="zh-CN" altLang="en-US" dirty="0"/>
+              <a:t>添加</a:t>
+            </a:r>
+            <a:r>
+              <a:rPr lang="en-US" dirty="0"/>
+              <a:t>CPU1</a:t>
+            </a:r>
+            <a:r>
+              <a:rPr lang="zh-CN" altLang="en-US" dirty="0"/>
+              <a:t>工程编译后</a:t>
+            </a:r>
+            <a:r>
+              <a:rPr lang="en-US" dirty="0"/>
+              <a:t>out</a:t>
+            </a:r>
+            <a:r>
+              <a:rPr lang="zh-CN" altLang="en-US" dirty="0"/>
+              <a:t>文件</a:t>
+            </a:r>
+            <a:endParaRPr lang="en-US" altLang="zh-CN" dirty="0"/>
+          </a:p>
+          <a:p>
+            <a:pPr marL="342900" indent="-342900">
+              <a:buFontTx/>
+              <a:buAutoNum type="arabicPeriod"/>
+            </a:pPr>
+            <a:r>
+              <a:rPr lang="zh-CN" altLang="en-US" dirty="0"/>
+              <a:t>配置选择</a:t>
+            </a:r>
+            <a:r>
+              <a:rPr lang="en-US" dirty="0"/>
+              <a:t>device</a:t>
+            </a:r>
+          </a:p>
+        </p:txBody>
+      </p:sp>
+      <p:pic>
+        <p:nvPicPr>
+          <p:cNvPr id="4" name="Picture 3" descr="A screenshot of a computer&#10;&#10;AI-generated content may be incorrect.">
+            <a:extLst>
+              <a:ext uri="{FF2B5EF4-FFF2-40B4-BE49-F238E27FC236}">
+                <a16:creationId xmlns:a16="http://schemas.microsoft.com/office/drawing/2014/main" id="{8E9E0465-5F29-550A-50D4-1202601529B2}"/>
+              </a:ext>
+            </a:extLst>
+          </p:cNvPr>
+          <p:cNvPicPr>
+            <a:picLocks noChangeAspect="1"/>
+          </p:cNvPicPr>
+          <p:nvPr/>
+        </p:nvPicPr>
+        <p:blipFill>
+          <a:blip r:embed="rId2">
+            <a:extLst>
+              <a:ext uri="{28A0092B-C50C-407E-A947-70E740481C1C}">
+                <a14:useLocalDpi xmlns:a14="http://schemas.microsoft.com/office/drawing/2010/main" val="0"/>
+              </a:ext>
+            </a:extLst>
+          </a:blip>
+          <a:srcRect/>
+          <a:stretch>
+            <a:fillRect/>
+          </a:stretch>
+        </p:blipFill>
+        <p:spPr bwMode="auto">
+          <a:xfrm>
+            <a:off x="3685234" y="411480"/>
+            <a:ext cx="4160482" cy="2372360"/>
+          </a:xfrm>
+          <a:prstGeom prst="rect">
+            <a:avLst/>
+          </a:prstGeom>
+          <a:noFill/>
+          <a:ln>
+            <a:noFill/>
+          </a:ln>
+        </p:spPr>
+      </p:pic>
+      <p:pic>
+        <p:nvPicPr>
+          <p:cNvPr id="5" name="Picture 4" descr="A screenshot of a computer&#10;&#10;AI-generated content may be incorrect.">
+            <a:extLst>
+              <a:ext uri="{FF2B5EF4-FFF2-40B4-BE49-F238E27FC236}">
+                <a16:creationId xmlns:a16="http://schemas.microsoft.com/office/drawing/2014/main" id="{7933FD6E-92EF-1ECD-7556-E22392D89EAB}"/>
+              </a:ext>
+            </a:extLst>
+          </p:cNvPr>
+          <p:cNvPicPr>
+            <a:picLocks noChangeAspect="1"/>
+          </p:cNvPicPr>
+          <p:nvPr/>
+        </p:nvPicPr>
+        <p:blipFill>
+          <a:blip r:embed="rId3">
+            <a:extLst>
+              <a:ext uri="{28A0092B-C50C-407E-A947-70E740481C1C}">
+                <a14:useLocalDpi xmlns:a14="http://schemas.microsoft.com/office/drawing/2010/main" val="0"/>
+              </a:ext>
+            </a:extLst>
+          </a:blip>
+          <a:srcRect/>
+          <a:stretch>
+            <a:fillRect/>
+          </a:stretch>
+        </p:blipFill>
+        <p:spPr bwMode="auto">
+          <a:xfrm>
+            <a:off x="6751013" y="373654"/>
+            <a:ext cx="2421149" cy="2372360"/>
+          </a:xfrm>
+          <a:prstGeom prst="rect">
+            <a:avLst/>
+          </a:prstGeom>
+          <a:noFill/>
+          <a:ln>
+            <a:noFill/>
+          </a:ln>
+        </p:spPr>
+      </p:pic>
+      <p:pic>
+        <p:nvPicPr>
+          <p:cNvPr id="6" name="Picture 5" descr="A screenshot of a project&#10;&#10;AI-generated content may be incorrect.">
+            <a:extLst>
+              <a:ext uri="{FF2B5EF4-FFF2-40B4-BE49-F238E27FC236}">
+                <a16:creationId xmlns:a16="http://schemas.microsoft.com/office/drawing/2014/main" id="{E7F1FA90-93E6-90E4-A9CA-6AF6621B7C1F}"/>
+              </a:ext>
+            </a:extLst>
+          </p:cNvPr>
+          <p:cNvPicPr>
+            <a:picLocks noChangeAspect="1"/>
+          </p:cNvPicPr>
+          <p:nvPr/>
+        </p:nvPicPr>
+        <p:blipFill>
+          <a:blip r:embed="rId4">
+            <a:extLst>
+              <a:ext uri="{28A0092B-C50C-407E-A947-70E740481C1C}">
+                <a14:useLocalDpi xmlns:a14="http://schemas.microsoft.com/office/drawing/2010/main" val="0"/>
+              </a:ext>
+            </a:extLst>
+          </a:blip>
+          <a:srcRect/>
+          <a:stretch>
+            <a:fillRect/>
+          </a:stretch>
+        </p:blipFill>
+        <p:spPr bwMode="auto">
+          <a:xfrm>
+            <a:off x="8856107" y="0"/>
+            <a:ext cx="2379879" cy="2896443"/>
+          </a:xfrm>
+          <a:prstGeom prst="rect">
+            <a:avLst/>
+          </a:prstGeom>
+          <a:noFill/>
+          <a:ln>
+            <a:noFill/>
+          </a:ln>
+        </p:spPr>
+      </p:pic>
+      <p:pic>
+        <p:nvPicPr>
+          <p:cNvPr id="7" name="Picture 6" descr="A screenshot of a computer&#10;&#10;AI-generated content may be incorrect.">
+            <a:extLst>
+              <a:ext uri="{FF2B5EF4-FFF2-40B4-BE49-F238E27FC236}">
+                <a16:creationId xmlns:a16="http://schemas.microsoft.com/office/drawing/2014/main" id="{8348CB20-CB27-FF12-5A7F-F1FA515777C4}"/>
+              </a:ext>
+            </a:extLst>
+          </p:cNvPr>
+          <p:cNvPicPr>
+            <a:picLocks noChangeAspect="1"/>
+          </p:cNvPicPr>
+          <p:nvPr/>
+        </p:nvPicPr>
+        <p:blipFill>
+          <a:blip r:embed="rId5">
+            <a:extLst>
+              <a:ext uri="{28A0092B-C50C-407E-A947-70E740481C1C}">
+                <a14:useLocalDpi xmlns:a14="http://schemas.microsoft.com/office/drawing/2010/main" val="0"/>
+              </a:ext>
+            </a:extLst>
+          </a:blip>
+          <a:srcRect/>
+          <a:stretch>
+            <a:fillRect/>
+          </a:stretch>
+        </p:blipFill>
+        <p:spPr bwMode="auto">
+          <a:xfrm>
+            <a:off x="2200352" y="3006321"/>
+            <a:ext cx="4336976" cy="3624048"/>
+          </a:xfrm>
+          <a:prstGeom prst="rect">
+            <a:avLst/>
+          </a:prstGeom>
+          <a:noFill/>
+          <a:ln>
+            <a:noFill/>
+          </a:ln>
+        </p:spPr>
+      </p:pic>
+      <p:pic>
+        <p:nvPicPr>
+          <p:cNvPr id="8" name="Picture 7">
+            <a:extLst>
+              <a:ext uri="{FF2B5EF4-FFF2-40B4-BE49-F238E27FC236}">
+                <a16:creationId xmlns:a16="http://schemas.microsoft.com/office/drawing/2014/main" id="{AAF16E12-4579-3A00-454E-621FB8B0774C}"/>
+              </a:ext>
+            </a:extLst>
+          </p:cNvPr>
+          <p:cNvPicPr>
+            <a:picLocks noChangeAspect="1"/>
+          </p:cNvPicPr>
+          <p:nvPr/>
+        </p:nvPicPr>
+        <p:blipFill>
+          <a:blip r:embed="rId6">
+            <a:extLst>
+              <a:ext uri="{28A0092B-C50C-407E-A947-70E740481C1C}">
+                <a14:useLocalDpi xmlns:a14="http://schemas.microsoft.com/office/drawing/2010/main" val="0"/>
+              </a:ext>
+            </a:extLst>
+          </a:blip>
+          <a:srcRect/>
+          <a:stretch>
+            <a:fillRect/>
+          </a:stretch>
+        </p:blipFill>
+        <p:spPr bwMode="auto">
+          <a:xfrm>
+            <a:off x="6802666" y="3006321"/>
+            <a:ext cx="4433320" cy="3539078"/>
+          </a:xfrm>
+          <a:prstGeom prst="rect">
+            <a:avLst/>
+          </a:prstGeom>
+          <a:noFill/>
+          <a:ln>
+            <a:noFill/>
+          </a:ln>
+        </p:spPr>
+      </p:pic>
+      <p:pic>
+        <p:nvPicPr>
+          <p:cNvPr id="12" name="Picture 11">
+            <a:extLst>
+              <a:ext uri="{FF2B5EF4-FFF2-40B4-BE49-F238E27FC236}">
+                <a16:creationId xmlns:a16="http://schemas.microsoft.com/office/drawing/2014/main" id="{A63F1584-F942-5ADE-B1DF-EECD2C0029CB}"/>
+              </a:ext>
+            </a:extLst>
+          </p:cNvPr>
+          <p:cNvPicPr>
+            <a:picLocks noChangeAspect="1"/>
+          </p:cNvPicPr>
+          <p:nvPr/>
+        </p:nvPicPr>
+        <p:blipFill>
+          <a:blip r:embed="rId7"/>
+          <a:stretch>
+            <a:fillRect/>
+          </a:stretch>
+        </p:blipFill>
+        <p:spPr>
+          <a:xfrm>
+            <a:off x="8631249" y="7315200"/>
+            <a:ext cx="3008907" cy="4819722"/>
+          </a:xfrm>
+          <a:prstGeom prst="rect">
+            <a:avLst/>
+          </a:prstGeom>
+        </p:spPr>
+      </p:pic>
+      <p:sp>
+        <p:nvSpPr>
+          <p:cNvPr id="13" name="Oval 12">
+            <a:extLst>
+              <a:ext uri="{FF2B5EF4-FFF2-40B4-BE49-F238E27FC236}">
+                <a16:creationId xmlns:a16="http://schemas.microsoft.com/office/drawing/2014/main" id="{5DE3D796-CB62-9516-C490-10D8D21F3732}"/>
+              </a:ext>
+            </a:extLst>
+          </p:cNvPr>
+          <p:cNvSpPr/>
+          <p:nvPr/>
+        </p:nvSpPr>
+        <p:spPr>
+          <a:xfrm>
+            <a:off x="5524106" y="1448221"/>
+            <a:ext cx="735291" cy="361725"/>
+          </a:xfrm>
+          <a:prstGeom prst="ellipse">
+            <a:avLst/>
+          </a:prstGeom>
+        </p:spPr>
+        <p:style>
+          <a:lnRef idx="2">
+            <a:schemeClr val="accent1">
+              <a:shade val="15000"/>
+            </a:schemeClr>
+          </a:lnRef>
+          <a:fillRef idx="1">
+            <a:schemeClr val="accent1"/>
+          </a:fillRef>
+          <a:effectRef idx="0">
+            <a:schemeClr val="accent1"/>
+          </a:effectRef>
+          <a:fontRef idx="minor">
+            <a:schemeClr val="lt1"/>
+          </a:fontRef>
+        </p:style>
+        <p:txBody>
+          <a:bodyPr rtlCol="0" anchor="ctr"/>
+          <a:lstStyle/>
+          <a:p>
+            <a:pPr algn="ctr"/>
+            <a:r>
+              <a:rPr lang="en-US" dirty="0"/>
+              <a:t>1-1</a:t>
+            </a:r>
+          </a:p>
+        </p:txBody>
+      </p:sp>
+      <p:sp>
+        <p:nvSpPr>
+          <p:cNvPr id="14" name="Oval 13">
+            <a:extLst>
+              <a:ext uri="{FF2B5EF4-FFF2-40B4-BE49-F238E27FC236}">
+                <a16:creationId xmlns:a16="http://schemas.microsoft.com/office/drawing/2014/main" id="{8DD175D4-7454-A7D8-EEC0-4DFB9ABF3102}"/>
+              </a:ext>
+            </a:extLst>
+          </p:cNvPr>
+          <p:cNvSpPr/>
+          <p:nvPr/>
+        </p:nvSpPr>
+        <p:spPr>
+          <a:xfrm>
+            <a:off x="7845715" y="1640264"/>
+            <a:ext cx="883505" cy="358218"/>
+          </a:xfrm>
+          <a:prstGeom prst="ellipse">
+            <a:avLst/>
+          </a:prstGeom>
+        </p:spPr>
+        <p:style>
+          <a:lnRef idx="2">
+            <a:schemeClr val="accent1">
+              <a:shade val="15000"/>
+            </a:schemeClr>
+          </a:lnRef>
+          <a:fillRef idx="1">
+            <a:schemeClr val="accent1"/>
+          </a:fillRef>
+          <a:effectRef idx="0">
+            <a:schemeClr val="accent1"/>
+          </a:effectRef>
+          <a:fontRef idx="minor">
+            <a:schemeClr val="lt1"/>
+          </a:fontRef>
+        </p:style>
+        <p:txBody>
+          <a:bodyPr rtlCol="0" anchor="ctr"/>
+          <a:lstStyle/>
+          <a:p>
+            <a:pPr algn="ctr"/>
+            <a:r>
+              <a:rPr lang="en-US" dirty="0"/>
+              <a:t>1-2</a:t>
+            </a:r>
+          </a:p>
+        </p:txBody>
+      </p:sp>
+      <p:sp>
+        <p:nvSpPr>
+          <p:cNvPr id="15" name="Oval 14">
+            <a:extLst>
+              <a:ext uri="{FF2B5EF4-FFF2-40B4-BE49-F238E27FC236}">
+                <a16:creationId xmlns:a16="http://schemas.microsoft.com/office/drawing/2014/main" id="{42A25E7E-FF71-C6B6-A50F-4F9E375B47F7}"/>
+              </a:ext>
+            </a:extLst>
+          </p:cNvPr>
+          <p:cNvSpPr/>
+          <p:nvPr/>
+        </p:nvSpPr>
+        <p:spPr>
+          <a:xfrm>
+            <a:off x="10539167" y="1074656"/>
+            <a:ext cx="372328" cy="373565"/>
+          </a:xfrm>
+          <a:prstGeom prst="ellipse">
+            <a:avLst/>
+          </a:prstGeom>
+        </p:spPr>
+        <p:style>
+          <a:lnRef idx="2">
+            <a:schemeClr val="accent1">
+              <a:shade val="15000"/>
+            </a:schemeClr>
+          </a:lnRef>
+          <a:fillRef idx="1">
+            <a:schemeClr val="accent1"/>
+          </a:fillRef>
+          <a:effectRef idx="0">
+            <a:schemeClr val="accent1"/>
+          </a:effectRef>
+          <a:fontRef idx="minor">
+            <a:schemeClr val="lt1"/>
+          </a:fontRef>
+        </p:style>
+        <p:txBody>
+          <a:bodyPr rtlCol="0" anchor="ctr"/>
+          <a:lstStyle/>
+          <a:p>
+            <a:pPr algn="ctr"/>
+            <a:r>
+              <a:rPr lang="en-US" dirty="0"/>
+              <a:t>3</a:t>
+            </a:r>
+          </a:p>
+        </p:txBody>
+      </p:sp>
+      <p:sp>
+        <p:nvSpPr>
+          <p:cNvPr id="16" name="Oval 15">
+            <a:extLst>
+              <a:ext uri="{FF2B5EF4-FFF2-40B4-BE49-F238E27FC236}">
+                <a16:creationId xmlns:a16="http://schemas.microsoft.com/office/drawing/2014/main" id="{4AEF35F2-F333-0C0B-2EB5-B55576162CB3}"/>
+              </a:ext>
+            </a:extLst>
+          </p:cNvPr>
+          <p:cNvSpPr/>
+          <p:nvPr/>
+        </p:nvSpPr>
+        <p:spPr>
+          <a:xfrm>
+            <a:off x="5099901" y="5231876"/>
+            <a:ext cx="311085" cy="273378"/>
+          </a:xfrm>
+          <a:prstGeom prst="ellipse">
+            <a:avLst/>
+          </a:prstGeom>
+        </p:spPr>
+        <p:style>
+          <a:lnRef idx="2">
+            <a:schemeClr val="accent1">
+              <a:shade val="15000"/>
+            </a:schemeClr>
+          </a:lnRef>
+          <a:fillRef idx="1">
+            <a:schemeClr val="accent1"/>
+          </a:fillRef>
+          <a:effectRef idx="0">
+            <a:schemeClr val="accent1"/>
+          </a:effectRef>
+          <a:fontRef idx="minor">
+            <a:schemeClr val="lt1"/>
+          </a:fontRef>
+        </p:style>
+        <p:txBody>
+          <a:bodyPr rtlCol="0" anchor="ctr"/>
+          <a:lstStyle/>
+          <a:p>
+            <a:pPr algn="ctr"/>
+            <a:r>
+              <a:rPr lang="en-US" dirty="0"/>
+              <a:t>4</a:t>
+            </a:r>
+          </a:p>
+        </p:txBody>
+      </p:sp>
+      <p:sp>
+        <p:nvSpPr>
+          <p:cNvPr id="17" name="Oval 16">
+            <a:extLst>
+              <a:ext uri="{FF2B5EF4-FFF2-40B4-BE49-F238E27FC236}">
+                <a16:creationId xmlns:a16="http://schemas.microsoft.com/office/drawing/2014/main" id="{57DAAE45-685F-3D1B-3A0D-7EAB2D6714E9}"/>
+              </a:ext>
+            </a:extLst>
+          </p:cNvPr>
+          <p:cNvSpPr/>
+          <p:nvPr/>
+        </p:nvSpPr>
+        <p:spPr>
+          <a:xfrm>
+            <a:off x="8455843" y="4298623"/>
+            <a:ext cx="400264" cy="348791"/>
+          </a:xfrm>
+          <a:prstGeom prst="ellipse">
+            <a:avLst/>
+          </a:prstGeom>
+        </p:spPr>
+        <p:style>
+          <a:lnRef idx="2">
+            <a:schemeClr val="accent1">
+              <a:shade val="15000"/>
+            </a:schemeClr>
+          </a:lnRef>
+          <a:fillRef idx="1">
+            <a:schemeClr val="accent1"/>
+          </a:fillRef>
+          <a:effectRef idx="0">
+            <a:schemeClr val="accent1"/>
+          </a:effectRef>
+          <a:fontRef idx="minor">
+            <a:schemeClr val="lt1"/>
+          </a:fontRef>
+        </p:style>
+        <p:txBody>
+          <a:bodyPr rtlCol="0" anchor="ctr"/>
+          <a:lstStyle/>
+          <a:p>
+            <a:pPr algn="ctr"/>
+            <a:r>
+              <a:rPr lang="en-US" dirty="0"/>
+              <a:t>5</a:t>
+            </a:r>
+          </a:p>
+        </p:txBody>
+      </p:sp>
+    </p:spTree>
+    <p:extLst>
+      <p:ext uri="{BB962C8B-B14F-4D97-AF65-F5344CB8AC3E}">
+        <p14:creationId xmlns:p14="http://schemas.microsoft.com/office/powerpoint/2010/main" val="1645091591"/>
+      </p:ext>
+    </p:extLst>
+  </p:cSld>
+  <p:clrMapOvr>
+    <a:masterClrMapping/>
+  </p:clrMapOvr>
+</p:sld>
+</file>
+
+<file path=ppt/slides/slide14.xml><?xml version="1.0" encoding="utf-8"?>
+<p:sld xmlns:a="http://schemas.openxmlformats.org/drawingml/2006/main" xmlns:r="http://schemas.openxmlformats.org/officeDocument/2006/relationships" xmlns:p="http://schemas.openxmlformats.org/presentationml/2006/main">
+  <p:cSld>
+    <p:spTree>
+      <p:nvGrpSpPr>
+        <p:cNvPr id="1" name="">
+          <a:extLst>
+            <a:ext uri="{FF2B5EF4-FFF2-40B4-BE49-F238E27FC236}">
+              <a16:creationId xmlns:a16="http://schemas.microsoft.com/office/drawing/2014/main" id="{5F531822-1863-F16B-B754-C6A2BCC89921}"/>
+            </a:ext>
+          </a:extLst>
+        </p:cNvPr>
+        <p:cNvGrpSpPr/>
+        <p:nvPr/>
+      </p:nvGrpSpPr>
+      <p:grpSpPr>
+        <a:xfrm>
+          <a:off x="0" y="0"/>
+          <a:ext cx="0" cy="0"/>
+          <a:chOff x="0" y="0"/>
+          <a:chExt cx="0" cy="0"/>
+        </a:xfrm>
+      </p:grpSpPr>
+      <p:sp>
+        <p:nvSpPr>
+          <p:cNvPr id="3" name="TextBox 2">
+            <a:extLst>
+              <a:ext uri="{FF2B5EF4-FFF2-40B4-BE49-F238E27FC236}">
+                <a16:creationId xmlns:a16="http://schemas.microsoft.com/office/drawing/2014/main" id="{FCFF3971-249B-8BE1-BC5F-7DA39AB9448A}"/>
+              </a:ext>
+            </a:extLst>
+          </p:cNvPr>
+          <p:cNvSpPr txBox="1"/>
+          <p:nvPr/>
+        </p:nvSpPr>
+        <p:spPr>
+          <a:xfrm>
+            <a:off x="274971" y="411480"/>
+            <a:ext cx="3021643" cy="3139321"/>
+          </a:xfrm>
+          <a:prstGeom prst="rect">
+            <a:avLst/>
+          </a:prstGeom>
+          <a:noFill/>
+        </p:spPr>
+        <p:txBody>
+          <a:bodyPr wrap="square" rtlCol="0">
+            <a:spAutoFit/>
+          </a:bodyPr>
+          <a:lstStyle/>
+          <a:p>
+            <a:r>
+              <a:rPr lang="en-US" altLang="zh-CN" dirty="0"/>
+              <a:t>5. </a:t>
+            </a:r>
+            <a:r>
+              <a:rPr lang="zh-CN" altLang="en-US" dirty="0"/>
+              <a:t>配置选择</a:t>
+            </a:r>
+            <a:r>
+              <a:rPr lang="en-US" dirty="0" err="1"/>
+              <a:t>Jlink</a:t>
+            </a:r>
+            <a:endParaRPr lang="en-US" dirty="0"/>
+          </a:p>
+          <a:p>
+            <a:r>
+              <a:rPr lang="en-US" dirty="0"/>
+              <a:t>6. CPU0</a:t>
+            </a:r>
+            <a:r>
+              <a:rPr lang="zh-CN" altLang="en-US" dirty="0"/>
+              <a:t>启动调试</a:t>
+            </a:r>
+            <a:endParaRPr lang="en-US" altLang="zh-CN" dirty="0"/>
+          </a:p>
+          <a:p>
+            <a:r>
+              <a:rPr lang="en-US" altLang="zh-CN" dirty="0"/>
+              <a:t>7. </a:t>
+            </a:r>
+            <a:r>
+              <a:rPr lang="zh-CN" altLang="en-US" dirty="0"/>
+              <a:t>对</a:t>
+            </a:r>
+            <a:r>
+              <a:rPr lang="en-US" dirty="0"/>
+              <a:t>CPU1</a:t>
+            </a:r>
+            <a:r>
+              <a:rPr lang="zh-CN" altLang="en-US" dirty="0"/>
+              <a:t>启动调试，点击</a:t>
+            </a:r>
+            <a:r>
+              <a:rPr lang="en-US" dirty="0"/>
+              <a:t>Attach to Running Target </a:t>
+            </a:r>
+            <a:r>
+              <a:rPr lang="zh-CN" altLang="en-US" dirty="0"/>
+              <a:t>或者使用下载按钮启动</a:t>
+            </a:r>
+            <a:endParaRPr lang="en-US" altLang="zh-CN" dirty="0"/>
+          </a:p>
+          <a:p>
+            <a:r>
+              <a:rPr lang="en-US" altLang="zh-CN" dirty="0"/>
+              <a:t>8. </a:t>
+            </a:r>
+            <a:r>
+              <a:rPr lang="zh-CN" altLang="en-US" dirty="0"/>
+              <a:t>通过对</a:t>
+            </a:r>
+            <a:r>
+              <a:rPr lang="en-US" dirty="0"/>
+              <a:t>CPU0</a:t>
+            </a:r>
+            <a:r>
+              <a:rPr lang="zh-CN" altLang="en-US" dirty="0"/>
+              <a:t>和</a:t>
+            </a:r>
+            <a:r>
+              <a:rPr lang="en-US" dirty="0"/>
+              <a:t>CPU1</a:t>
+            </a:r>
+            <a:r>
+              <a:rPr lang="zh-CN" altLang="en-US" dirty="0"/>
+              <a:t>设置断点，可以观察到一旦</a:t>
+            </a:r>
+            <a:r>
+              <a:rPr lang="en-US" dirty="0"/>
+              <a:t>CPU1</a:t>
+            </a:r>
+            <a:r>
+              <a:rPr lang="zh-CN" altLang="en-US" dirty="0"/>
+              <a:t>代码调用了</a:t>
+            </a:r>
+            <a:r>
+              <a:rPr lang="en-US" dirty="0" err="1"/>
+              <a:t>R_BSP_SecondaryCoreStart</a:t>
+            </a:r>
+            <a:r>
+              <a:rPr lang="en-US" dirty="0"/>
+              <a:t>()</a:t>
+            </a:r>
+            <a:r>
+              <a:rPr lang="zh-CN" altLang="en-US" dirty="0"/>
+              <a:t>函数，</a:t>
+            </a:r>
+            <a:r>
+              <a:rPr lang="en-US" dirty="0"/>
+              <a:t>CPU1</a:t>
+            </a:r>
+            <a:r>
+              <a:rPr lang="zh-CN" altLang="en-US" dirty="0"/>
+              <a:t>工程将会启动运行代码跳到断点处</a:t>
+            </a:r>
+            <a:endParaRPr lang="en-US" dirty="0"/>
+          </a:p>
+        </p:txBody>
+      </p:sp>
+      <p:pic>
+        <p:nvPicPr>
+          <p:cNvPr id="9" name="Picture 8" descr="A screenshot of a computer&#10;&#10;AI-generated content may be incorrect.">
+            <a:extLst>
+              <a:ext uri="{FF2B5EF4-FFF2-40B4-BE49-F238E27FC236}">
+                <a16:creationId xmlns:a16="http://schemas.microsoft.com/office/drawing/2014/main" id="{CF8D9021-0E06-336E-C226-BAD7C3C72BB3}"/>
+              </a:ext>
+            </a:extLst>
+          </p:cNvPr>
+          <p:cNvPicPr>
+            <a:picLocks noChangeAspect="1"/>
+          </p:cNvPicPr>
+          <p:nvPr/>
+        </p:nvPicPr>
+        <p:blipFill>
+          <a:blip r:embed="rId2">
+            <a:extLst>
+              <a:ext uri="{28A0092B-C50C-407E-A947-70E740481C1C}">
+                <a14:useLocalDpi xmlns:a14="http://schemas.microsoft.com/office/drawing/2010/main" val="0"/>
+              </a:ext>
+            </a:extLst>
+          </a:blip>
+          <a:srcRect/>
+          <a:stretch>
+            <a:fillRect/>
+          </a:stretch>
+        </p:blipFill>
+        <p:spPr bwMode="auto">
+          <a:xfrm>
+            <a:off x="3296614" y="241798"/>
+            <a:ext cx="3759200" cy="2279650"/>
+          </a:xfrm>
+          <a:prstGeom prst="rect">
+            <a:avLst/>
+          </a:prstGeom>
+          <a:noFill/>
+          <a:ln>
+            <a:noFill/>
+          </a:ln>
+        </p:spPr>
+      </p:pic>
+      <p:pic>
+        <p:nvPicPr>
+          <p:cNvPr id="10" name="Picture 9" descr="A screenshot of a computer&#10;&#10;AI-generated content may be incorrect.">
+            <a:extLst>
+              <a:ext uri="{FF2B5EF4-FFF2-40B4-BE49-F238E27FC236}">
+                <a16:creationId xmlns:a16="http://schemas.microsoft.com/office/drawing/2014/main" id="{FAB2979A-0290-C750-E3A2-37B976D11506}"/>
+              </a:ext>
+            </a:extLst>
+          </p:cNvPr>
+          <p:cNvPicPr>
+            <a:picLocks noChangeAspect="1"/>
+          </p:cNvPicPr>
+          <p:nvPr/>
+        </p:nvPicPr>
+        <p:blipFill>
+          <a:blip r:embed="rId3">
+            <a:extLst>
+              <a:ext uri="{28A0092B-C50C-407E-A947-70E740481C1C}">
+                <a14:useLocalDpi xmlns:a14="http://schemas.microsoft.com/office/drawing/2010/main" val="0"/>
+              </a:ext>
+            </a:extLst>
+          </a:blip>
+          <a:srcRect/>
+          <a:stretch>
+            <a:fillRect/>
+          </a:stretch>
+        </p:blipFill>
+        <p:spPr bwMode="auto">
+          <a:xfrm>
+            <a:off x="6248400" y="147663"/>
+            <a:ext cx="5943600" cy="3161665"/>
+          </a:xfrm>
+          <a:prstGeom prst="rect">
+            <a:avLst/>
+          </a:prstGeom>
+          <a:noFill/>
+          <a:ln>
+            <a:noFill/>
+          </a:ln>
+        </p:spPr>
+      </p:pic>
+      <p:pic>
+        <p:nvPicPr>
+          <p:cNvPr id="12" name="Picture 11">
+            <a:extLst>
+              <a:ext uri="{FF2B5EF4-FFF2-40B4-BE49-F238E27FC236}">
+                <a16:creationId xmlns:a16="http://schemas.microsoft.com/office/drawing/2014/main" id="{FF7373D8-C273-8DB2-50C2-CABD9CA449B8}"/>
+              </a:ext>
+            </a:extLst>
+          </p:cNvPr>
+          <p:cNvPicPr>
+            <a:picLocks noChangeAspect="1"/>
+          </p:cNvPicPr>
+          <p:nvPr/>
+        </p:nvPicPr>
+        <p:blipFill>
+          <a:blip r:embed="rId4"/>
+          <a:stretch>
+            <a:fillRect/>
+          </a:stretch>
+        </p:blipFill>
+        <p:spPr>
+          <a:xfrm>
+            <a:off x="8631249" y="7315200"/>
+            <a:ext cx="3008907" cy="4819722"/>
+          </a:xfrm>
+          <a:prstGeom prst="rect">
+            <a:avLst/>
+          </a:prstGeom>
+        </p:spPr>
+      </p:pic>
+      <p:sp>
+        <p:nvSpPr>
+          <p:cNvPr id="2" name="Oval 1">
+            <a:extLst>
+              <a:ext uri="{FF2B5EF4-FFF2-40B4-BE49-F238E27FC236}">
+                <a16:creationId xmlns:a16="http://schemas.microsoft.com/office/drawing/2014/main" id="{C78FD4F1-1DAA-7454-6B42-C945A17934DE}"/>
+              </a:ext>
+            </a:extLst>
+          </p:cNvPr>
+          <p:cNvSpPr/>
+          <p:nvPr/>
+        </p:nvSpPr>
+        <p:spPr>
+          <a:xfrm>
+            <a:off x="5501775" y="1981140"/>
+            <a:ext cx="273377" cy="245097"/>
+          </a:xfrm>
+          <a:prstGeom prst="ellipse">
+            <a:avLst/>
+          </a:prstGeom>
+        </p:spPr>
+        <p:style>
+          <a:lnRef idx="2">
+            <a:schemeClr val="accent1">
+              <a:shade val="15000"/>
+            </a:schemeClr>
+          </a:lnRef>
+          <a:fillRef idx="1">
+            <a:schemeClr val="accent1"/>
+          </a:fillRef>
+          <a:effectRef idx="0">
+            <a:schemeClr val="accent1"/>
+          </a:effectRef>
+          <a:fontRef idx="minor">
+            <a:schemeClr val="lt1"/>
+          </a:fontRef>
+        </p:style>
+        <p:txBody>
+          <a:bodyPr rtlCol="0" anchor="ctr"/>
+          <a:lstStyle/>
+          <a:p>
+            <a:pPr algn="ctr"/>
+            <a:r>
+              <a:rPr lang="en-US" dirty="0"/>
+              <a:t>5</a:t>
+            </a:r>
+          </a:p>
+        </p:txBody>
+      </p:sp>
+      <p:sp>
+        <p:nvSpPr>
+          <p:cNvPr id="11" name="Oval 10">
+            <a:extLst>
+              <a:ext uri="{FF2B5EF4-FFF2-40B4-BE49-F238E27FC236}">
+                <a16:creationId xmlns:a16="http://schemas.microsoft.com/office/drawing/2014/main" id="{1C7C0C4C-BA3B-3909-862C-7F6C0C4589C0}"/>
+              </a:ext>
+            </a:extLst>
+          </p:cNvPr>
+          <p:cNvSpPr/>
+          <p:nvPr/>
+        </p:nvSpPr>
+        <p:spPr>
+          <a:xfrm>
+            <a:off x="11256470" y="650450"/>
+            <a:ext cx="311084" cy="270273"/>
+          </a:xfrm>
+          <a:prstGeom prst="ellipse">
+            <a:avLst/>
+          </a:prstGeom>
+        </p:spPr>
+        <p:style>
+          <a:lnRef idx="2">
+            <a:schemeClr val="accent1">
+              <a:shade val="15000"/>
+            </a:schemeClr>
+          </a:lnRef>
+          <a:fillRef idx="1">
+            <a:schemeClr val="accent1"/>
+          </a:fillRef>
+          <a:effectRef idx="0">
+            <a:schemeClr val="accent1"/>
+          </a:effectRef>
+          <a:fontRef idx="minor">
+            <a:schemeClr val="lt1"/>
+          </a:fontRef>
+        </p:style>
+        <p:txBody>
+          <a:bodyPr rtlCol="0" anchor="ctr"/>
+          <a:lstStyle/>
+          <a:p>
+            <a:pPr algn="ctr"/>
+            <a:r>
+              <a:rPr lang="en-US" dirty="0"/>
+              <a:t>6</a:t>
+            </a:r>
+          </a:p>
+        </p:txBody>
+      </p:sp>
+      <p:pic>
+        <p:nvPicPr>
+          <p:cNvPr id="14" name="Picture 13">
+            <a:extLst>
+              <a:ext uri="{FF2B5EF4-FFF2-40B4-BE49-F238E27FC236}">
+                <a16:creationId xmlns:a16="http://schemas.microsoft.com/office/drawing/2014/main" id="{B05012BF-659E-A989-0639-BCF8DDA0186C}"/>
+              </a:ext>
+            </a:extLst>
+          </p:cNvPr>
+          <p:cNvPicPr>
+            <a:picLocks noChangeAspect="1"/>
+          </p:cNvPicPr>
+          <p:nvPr/>
+        </p:nvPicPr>
+        <p:blipFill>
+          <a:blip r:embed="rId5"/>
+          <a:stretch>
+            <a:fillRect/>
+          </a:stretch>
+        </p:blipFill>
+        <p:spPr>
+          <a:xfrm>
+            <a:off x="3342008" y="3444187"/>
+            <a:ext cx="2114372" cy="4588971"/>
+          </a:xfrm>
+          <a:prstGeom prst="rect">
+            <a:avLst/>
+          </a:prstGeom>
+        </p:spPr>
+      </p:pic>
+      <p:pic>
+        <p:nvPicPr>
+          <p:cNvPr id="16" name="Picture 15">
+            <a:extLst>
+              <a:ext uri="{FF2B5EF4-FFF2-40B4-BE49-F238E27FC236}">
+                <a16:creationId xmlns:a16="http://schemas.microsoft.com/office/drawing/2014/main" id="{6EA99EA1-D823-52A3-793B-627DBB717B44}"/>
+              </a:ext>
+            </a:extLst>
+          </p:cNvPr>
+          <p:cNvPicPr>
+            <a:picLocks noChangeAspect="1"/>
+          </p:cNvPicPr>
+          <p:nvPr/>
+        </p:nvPicPr>
+        <p:blipFill>
+          <a:blip r:embed="rId6"/>
+          <a:stretch>
+            <a:fillRect/>
+          </a:stretch>
+        </p:blipFill>
+        <p:spPr>
+          <a:xfrm>
+            <a:off x="5512947" y="3444187"/>
+            <a:ext cx="6404082" cy="2533121"/>
+          </a:xfrm>
+          <a:prstGeom prst="rect">
+            <a:avLst/>
+          </a:prstGeom>
+        </p:spPr>
+      </p:pic>
+      <p:cxnSp>
+        <p:nvCxnSpPr>
+          <p:cNvPr id="18" name="Straight Arrow Connector 17">
+            <a:extLst>
+              <a:ext uri="{FF2B5EF4-FFF2-40B4-BE49-F238E27FC236}">
+                <a16:creationId xmlns:a16="http://schemas.microsoft.com/office/drawing/2014/main" id="{E2ACCD80-A6C4-FC84-0793-559B372812EA}"/>
+              </a:ext>
+            </a:extLst>
+          </p:cNvPr>
+          <p:cNvCxnSpPr/>
+          <p:nvPr/>
+        </p:nvCxnSpPr>
+        <p:spPr>
+          <a:xfrm flipH="1">
+            <a:off x="6806153" y="3789575"/>
+            <a:ext cx="2950589" cy="2187733"/>
+          </a:xfrm>
+          <a:prstGeom prst="straightConnector1">
+            <a:avLst/>
+          </a:prstGeom>
+          <a:ln>
+            <a:tailEnd type="triangle"/>
+          </a:ln>
+        </p:spPr>
+        <p:style>
+          <a:lnRef idx="2">
+            <a:schemeClr val="accent1"/>
+          </a:lnRef>
+          <a:fillRef idx="0">
+            <a:schemeClr val="accent1"/>
+          </a:fillRef>
+          <a:effectRef idx="1">
+            <a:schemeClr val="accent1"/>
+          </a:effectRef>
+          <a:fontRef idx="minor">
+            <a:schemeClr val="tx1"/>
+          </a:fontRef>
+        </p:style>
+      </p:cxnSp>
+      <p:cxnSp>
+        <p:nvCxnSpPr>
+          <p:cNvPr id="20" name="Straight Arrow Connector 19">
+            <a:extLst>
+              <a:ext uri="{FF2B5EF4-FFF2-40B4-BE49-F238E27FC236}">
+                <a16:creationId xmlns:a16="http://schemas.microsoft.com/office/drawing/2014/main" id="{C2BBA6CC-9F1F-48B8-7631-700093A9DA2F}"/>
+              </a:ext>
+            </a:extLst>
+          </p:cNvPr>
+          <p:cNvCxnSpPr/>
+          <p:nvPr/>
+        </p:nvCxnSpPr>
+        <p:spPr>
+          <a:xfrm flipV="1">
+            <a:off x="5071621" y="6108569"/>
+            <a:ext cx="1498861" cy="914400"/>
+          </a:xfrm>
+          <a:prstGeom prst="straightConnector1">
+            <a:avLst/>
+          </a:prstGeom>
+          <a:ln>
+            <a:tailEnd type="triangle"/>
+          </a:ln>
+        </p:spPr>
+        <p:style>
+          <a:lnRef idx="2">
+            <a:schemeClr val="accent1"/>
+          </a:lnRef>
+          <a:fillRef idx="0">
+            <a:schemeClr val="accent1"/>
+          </a:fillRef>
+          <a:effectRef idx="1">
+            <a:schemeClr val="accent1"/>
+          </a:effectRef>
+          <a:fontRef idx="minor">
+            <a:schemeClr val="tx1"/>
+          </a:fontRef>
+        </p:style>
+      </p:cxnSp>
+      <p:sp>
+        <p:nvSpPr>
+          <p:cNvPr id="21" name="Oval 20">
+            <a:extLst>
+              <a:ext uri="{FF2B5EF4-FFF2-40B4-BE49-F238E27FC236}">
+                <a16:creationId xmlns:a16="http://schemas.microsoft.com/office/drawing/2014/main" id="{9D921A1D-2CE7-E94E-E1CA-6288EEE6458F}"/>
+              </a:ext>
+            </a:extLst>
+          </p:cNvPr>
+          <p:cNvSpPr/>
+          <p:nvPr/>
+        </p:nvSpPr>
+        <p:spPr>
+          <a:xfrm>
+            <a:off x="6492956" y="5935875"/>
+            <a:ext cx="485332" cy="345388"/>
+          </a:xfrm>
+          <a:prstGeom prst="ellipse">
+            <a:avLst/>
+          </a:prstGeom>
+        </p:spPr>
+        <p:style>
+          <a:lnRef idx="2">
+            <a:schemeClr val="accent1">
+              <a:shade val="15000"/>
+            </a:schemeClr>
+          </a:lnRef>
+          <a:fillRef idx="1">
+            <a:schemeClr val="accent1"/>
+          </a:fillRef>
+          <a:effectRef idx="0">
+            <a:schemeClr val="accent1"/>
+          </a:effectRef>
+          <a:fontRef idx="minor">
+            <a:schemeClr val="lt1"/>
+          </a:fontRef>
+        </p:style>
+        <p:txBody>
+          <a:bodyPr rtlCol="0" anchor="ctr"/>
+          <a:lstStyle/>
+          <a:p>
+            <a:pPr algn="ctr"/>
+            <a:r>
+              <a:rPr lang="en-US" dirty="0"/>
+              <a:t>8</a:t>
+            </a:r>
+          </a:p>
+        </p:txBody>
+      </p:sp>
+    </p:spTree>
+    <p:extLst>
+      <p:ext uri="{BB962C8B-B14F-4D97-AF65-F5344CB8AC3E}">
+        <p14:creationId xmlns:p14="http://schemas.microsoft.com/office/powerpoint/2010/main" val="3457447542"/>
+      </p:ext>
+    </p:extLst>
+  </p:cSld>
+  <p:clrMapOvr>
+    <a:masterClrMapping/>
+  </p:clrMapOvr>
+</p:sld>
+</file>
+
+<file path=ppt/slides/slide15.xml><?xml version="1.0" encoding="utf-8"?>
+<p:sld xmlns:a="http://schemas.openxmlformats.org/drawingml/2006/main" xmlns:r="http://schemas.openxmlformats.org/officeDocument/2006/relationships" xmlns:p="http://schemas.openxmlformats.org/presentationml/2006/main">
+  <p:cSld>
+    <p:bg>
+      <p:bgPr>
+        <a:solidFill>
+          <a:schemeClr val="bg1"/>
+        </a:solidFill>
+        <a:effectLst/>
+      </p:bgPr>
+    </p:bg>
+    <p:spTree>
+      <p:nvGrpSpPr>
+        <p:cNvPr id="1" name=""/>
+        <p:cNvGrpSpPr/>
+        <p:nvPr/>
+      </p:nvGrpSpPr>
+      <p:grpSpPr>
+        <a:xfrm>
+          <a:off x="0" y="0"/>
+          <a:ext cx="0" cy="0"/>
+          <a:chOff x="0" y="0"/>
+          <a:chExt cx="0" cy="0"/>
+        </a:xfrm>
+      </p:grpSpPr>
+      <p:pic>
+        <p:nvPicPr>
+          <p:cNvPr id="2" name="Picture 1" descr="A screenshot of a computer&#10;&#10;AI-generated content may be incorrect.">
+            <a:extLst>
+              <a:ext uri="{FF2B5EF4-FFF2-40B4-BE49-F238E27FC236}">
+                <a16:creationId xmlns:a16="http://schemas.microsoft.com/office/drawing/2014/main" id="{3DD6E958-607A-220B-E62A-CC60BC2A4959}"/>
+              </a:ext>
+            </a:extLst>
+          </p:cNvPr>
+          <p:cNvPicPr>
+            <a:picLocks noChangeAspect="1"/>
+          </p:cNvPicPr>
+          <p:nvPr/>
+        </p:nvPicPr>
+        <p:blipFill>
+          <a:blip r:embed="rId2" cstate="print">
+            <a:extLst>
+              <a:ext uri="{28A0092B-C50C-407E-A947-70E740481C1C}">
+                <a14:useLocalDpi xmlns:a14="http://schemas.microsoft.com/office/drawing/2010/main" val="0"/>
+              </a:ext>
+            </a:extLst>
+          </a:blip>
+          <a:stretch>
+            <a:fillRect/>
+          </a:stretch>
+        </p:blipFill>
+        <p:spPr bwMode="auto">
+          <a:xfrm>
+            <a:off x="643467" y="1288881"/>
+            <a:ext cx="10905066" cy="4280236"/>
+          </a:xfrm>
+          <a:prstGeom prst="rect">
+            <a:avLst/>
+          </a:prstGeom>
+          <a:noFill/>
+        </p:spPr>
+      </p:pic>
+      <p:sp>
+        <p:nvSpPr>
+          <p:cNvPr id="3" name="TextBox 2">
+            <a:extLst>
+              <a:ext uri="{FF2B5EF4-FFF2-40B4-BE49-F238E27FC236}">
+                <a16:creationId xmlns:a16="http://schemas.microsoft.com/office/drawing/2014/main" id="{5F6892D4-0A1D-218A-AC69-D76CE4E26719}"/>
+              </a:ext>
+            </a:extLst>
+          </p:cNvPr>
+          <p:cNvSpPr txBox="1"/>
+          <p:nvPr/>
+        </p:nvSpPr>
+        <p:spPr>
+          <a:xfrm>
+            <a:off x="643467" y="722376"/>
+            <a:ext cx="5556165" cy="369332"/>
+          </a:xfrm>
+          <a:prstGeom prst="rect">
+            <a:avLst/>
+          </a:prstGeom>
+          <a:noFill/>
+        </p:spPr>
+        <p:txBody>
+          <a:bodyPr wrap="square" rtlCol="0">
+            <a:spAutoFit/>
+          </a:bodyPr>
+          <a:lstStyle/>
+          <a:p>
+            <a:r>
+              <a:rPr lang="zh-CN" altLang="en-US" dirty="0"/>
+              <a:t>双核运行调试界面截图</a:t>
+            </a:r>
+            <a:endParaRPr lang="en-US" dirty="0"/>
+          </a:p>
+        </p:txBody>
+      </p:sp>
+    </p:spTree>
+    <p:extLst>
+      <p:ext uri="{BB962C8B-B14F-4D97-AF65-F5344CB8AC3E}">
+        <p14:creationId xmlns:p14="http://schemas.microsoft.com/office/powerpoint/2010/main" val="447200167"/>
       </p:ext>
     </p:extLst>
   </p:cSld>

</xml_diff>